<commit_message>
updated the files from the last talk and a couple more funny pictures
</commit_message>
<xml_diff>
--- a/pre-slides-for-main-presentation.pptx
+++ b/pre-slides-for-main-presentation.pptx
@@ -276,7 +276,7 @@
           <a:p>
             <a:fld id="{CE074F0D-30AF-4ED3-AD57-432CFD6F4500}" type="datetimeFigureOut">
               <a:rPr lang="en-US" smtClean="0"/>
-              <a:t>8/1/19</a:t>
+              <a:t>9/4/19</a:t>
             </a:fld>
             <a:endParaRPr lang="en-US"/>
           </a:p>
@@ -474,7 +474,7 @@
           <a:p>
             <a:fld id="{CE074F0D-30AF-4ED3-AD57-432CFD6F4500}" type="datetimeFigureOut">
               <a:rPr lang="en-US" smtClean="0"/>
-              <a:t>8/1/19</a:t>
+              <a:t>9/4/19</a:t>
             </a:fld>
             <a:endParaRPr lang="en-US"/>
           </a:p>
@@ -682,7 +682,7 @@
           <a:p>
             <a:fld id="{CE074F0D-30AF-4ED3-AD57-432CFD6F4500}" type="datetimeFigureOut">
               <a:rPr lang="en-US" smtClean="0"/>
-              <a:t>8/1/19</a:t>
+              <a:t>9/4/19</a:t>
             </a:fld>
             <a:endParaRPr lang="en-US"/>
           </a:p>
@@ -880,7 +880,7 @@
           <a:p>
             <a:fld id="{CE074F0D-30AF-4ED3-AD57-432CFD6F4500}" type="datetimeFigureOut">
               <a:rPr lang="en-US" smtClean="0"/>
-              <a:t>8/1/19</a:t>
+              <a:t>9/4/19</a:t>
             </a:fld>
             <a:endParaRPr lang="en-US"/>
           </a:p>
@@ -1155,7 +1155,7 @@
           <a:p>
             <a:fld id="{CE074F0D-30AF-4ED3-AD57-432CFD6F4500}" type="datetimeFigureOut">
               <a:rPr lang="en-US" smtClean="0"/>
-              <a:t>8/1/19</a:t>
+              <a:t>9/4/19</a:t>
             </a:fld>
             <a:endParaRPr lang="en-US"/>
           </a:p>
@@ -1420,7 +1420,7 @@
           <a:p>
             <a:fld id="{CE074F0D-30AF-4ED3-AD57-432CFD6F4500}" type="datetimeFigureOut">
               <a:rPr lang="en-US" smtClean="0"/>
-              <a:t>8/1/19</a:t>
+              <a:t>9/4/19</a:t>
             </a:fld>
             <a:endParaRPr lang="en-US"/>
           </a:p>
@@ -1832,7 +1832,7 @@
           <a:p>
             <a:fld id="{CE074F0D-30AF-4ED3-AD57-432CFD6F4500}" type="datetimeFigureOut">
               <a:rPr lang="en-US" smtClean="0"/>
-              <a:t>8/1/19</a:t>
+              <a:t>9/4/19</a:t>
             </a:fld>
             <a:endParaRPr lang="en-US"/>
           </a:p>
@@ -1973,7 +1973,7 @@
           <a:p>
             <a:fld id="{CE074F0D-30AF-4ED3-AD57-432CFD6F4500}" type="datetimeFigureOut">
               <a:rPr lang="en-US" smtClean="0"/>
-              <a:t>8/1/19</a:t>
+              <a:t>9/4/19</a:t>
             </a:fld>
             <a:endParaRPr lang="en-US"/>
           </a:p>
@@ -2086,7 +2086,7 @@
           <a:p>
             <a:fld id="{CE074F0D-30AF-4ED3-AD57-432CFD6F4500}" type="datetimeFigureOut">
               <a:rPr lang="en-US" smtClean="0"/>
-              <a:t>8/1/19</a:t>
+              <a:t>9/4/19</a:t>
             </a:fld>
             <a:endParaRPr lang="en-US"/>
           </a:p>
@@ -2397,7 +2397,7 @@
           <a:p>
             <a:fld id="{CE074F0D-30AF-4ED3-AD57-432CFD6F4500}" type="datetimeFigureOut">
               <a:rPr lang="en-US" smtClean="0"/>
-              <a:t>8/1/19</a:t>
+              <a:t>9/4/19</a:t>
             </a:fld>
             <a:endParaRPr lang="en-US"/>
           </a:p>
@@ -2685,7 +2685,7 @@
           <a:p>
             <a:fld id="{CE074F0D-30AF-4ED3-AD57-432CFD6F4500}" type="datetimeFigureOut">
               <a:rPr lang="en-US" smtClean="0"/>
-              <a:t>8/1/19</a:t>
+              <a:t>9/4/19</a:t>
             </a:fld>
             <a:endParaRPr lang="en-US"/>
           </a:p>
@@ -2926,7 +2926,7 @@
           <a:p>
             <a:fld id="{CE074F0D-30AF-4ED3-AD57-432CFD6F4500}" type="datetimeFigureOut">
               <a:rPr lang="en-US" smtClean="0"/>
-              <a:t>8/1/19</a:t>
+              <a:t>9/4/19</a:t>
             </a:fld>
             <a:endParaRPr lang="en-US"/>
           </a:p>

</xml_diff>